<commit_message>
String Table With Application
</commit_message>
<xml_diff>
--- a/Python_DataScience_Topics.pptx
+++ b/Python_DataScience_Topics.pptx
@@ -65,7 +65,7 @@
         <p:spPr>
           <a:xfrm>
             <a:off x="457200" y="274680"/>
-            <a:ext cx="8228520" cy="1141920"/>
+            <a:ext cx="8228160" cy="1141560"/>
           </a:xfrm>
           <a:prstGeom prst="rect">
             <a:avLst/>
@@ -105,7 +105,7 @@
         <p:spPr>
           <a:xfrm>
             <a:off x="457200" y="1600200"/>
-            <a:ext cx="8228520" cy="4524840"/>
+            <a:ext cx="8228160" cy="4524480"/>
           </a:xfrm>
           <a:prstGeom prst="rect">
             <a:avLst/>
@@ -166,7 +166,7 @@
         <p:txBody>
           <a:bodyPr/>
           <a:p>
-            <a:fld id="{887F3A43-4729-47F5-B312-F9D711D22B62}" type="slidenum">
+            <a:fld id="{F55A0453-1670-40B8-B1B7-BA048458BC45}" type="slidenum">
               <a:t>&lt;#&gt;</a:t>
             </a:fld>
           </a:p>
@@ -249,7 +249,7 @@
         <p:txBody>
           <a:bodyPr/>
           <a:p>
-            <a:fld id="{178E1CB9-219E-49F6-8B7B-4DFB13D27362}" type="slidenum">
+            <a:fld id="{7D19C54E-F834-4330-8671-300F5283E9B2}" type="slidenum">
               <a:t>&lt;#&gt;</a:t>
             </a:fld>
           </a:p>
@@ -332,7 +332,7 @@
         <p:txBody>
           <a:bodyPr/>
           <a:p>
-            <a:fld id="{3B622233-DA00-4C37-A87F-F83A7785521D}" type="slidenum">
+            <a:fld id="{B0354185-FAB3-4850-AC2E-86CA6C6CF1C0}" type="slidenum">
               <a:t>&lt;#&gt;</a:t>
             </a:fld>
           </a:p>
@@ -415,7 +415,7 @@
         <p:txBody>
           <a:bodyPr/>
           <a:p>
-            <a:fld id="{8FEAAFB2-9F21-4C42-B977-F15A17EE2CFB}" type="slidenum">
+            <a:fld id="{44AE5983-35CF-4604-BA28-67677ECEED97}" type="slidenum">
               <a:t>&lt;#&gt;</a:t>
             </a:fld>
           </a:p>
@@ -498,7 +498,7 @@
         <p:txBody>
           <a:bodyPr/>
           <a:p>
-            <a:fld id="{600C5D62-C350-4BB8-9749-F19AE8CA7518}" type="slidenum">
+            <a:fld id="{49A7DB9E-FAA7-42CC-9F6B-CC0FC13E3553}" type="slidenum">
               <a:t>&lt;#&gt;</a:t>
             </a:fld>
           </a:p>
@@ -560,7 +560,7 @@
         <p:spPr>
           <a:xfrm>
             <a:off x="457200" y="274680"/>
-            <a:ext cx="8228520" cy="1141920"/>
+            <a:ext cx="8228160" cy="1141560"/>
           </a:xfrm>
           <a:prstGeom prst="rect">
             <a:avLst/>
@@ -600,7 +600,7 @@
         <p:spPr>
           <a:xfrm>
             <a:off x="457200" y="1600200"/>
-            <a:ext cx="8228520" cy="4524840"/>
+            <a:ext cx="8228160" cy="4524480"/>
           </a:xfrm>
           <a:prstGeom prst="rect">
             <a:avLst/>
@@ -664,7 +664,7 @@
         <p:txBody>
           <a:bodyPr/>
           <a:p>
-            <a:fld id="{96721F0B-B54B-4B33-915F-1CCFF64FB600}" type="slidenum">
+            <a:fld id="{C9B69351-536C-45F5-95C3-6C3CB05AD728}" type="slidenum">
               <a:t>&lt;#&gt;</a:t>
             </a:fld>
           </a:p>
@@ -747,7 +747,7 @@
         <p:txBody>
           <a:bodyPr/>
           <a:p>
-            <a:fld id="{1C8D69A0-499B-444F-A99F-1948CA917476}" type="slidenum">
+            <a:fld id="{4112C85B-55E8-43C9-88D0-A2EFE982DDE9}" type="slidenum">
               <a:t>&lt;#&gt;</a:t>
             </a:fld>
           </a:p>
@@ -809,7 +809,7 @@
         <p:spPr>
           <a:xfrm>
             <a:off x="457200" y="274680"/>
-            <a:ext cx="8228520" cy="1141920"/>
+            <a:ext cx="8228160" cy="1141560"/>
           </a:xfrm>
           <a:prstGeom prst="rect">
             <a:avLst/>
@@ -849,7 +849,7 @@
         <p:spPr>
           <a:xfrm>
             <a:off x="457200" y="1600200"/>
-            <a:ext cx="4015440" cy="4524840"/>
+            <a:ext cx="4015080" cy="4524480"/>
           </a:xfrm>
           <a:prstGeom prst="rect">
             <a:avLst/>
@@ -891,8 +891,8 @@
         </p:nvSpPr>
         <p:spPr>
           <a:xfrm>
-            <a:off x="4673880" y="1600200"/>
-            <a:ext cx="4015440" cy="4524840"/>
+            <a:off x="4673520" y="1600200"/>
+            <a:ext cx="4015080" cy="4524480"/>
           </a:xfrm>
           <a:prstGeom prst="rect">
             <a:avLst/>
@@ -956,7 +956,7 @@
         <p:txBody>
           <a:bodyPr/>
           <a:p>
-            <a:fld id="{9E530F32-F7B3-4487-AB7C-5F4A17E32A7C}" type="slidenum">
+            <a:fld id="{0479C2ED-F931-4332-8819-04AA24F64609}" type="slidenum">
               <a:t>&lt;#&gt;</a:t>
             </a:fld>
           </a:p>
@@ -1039,7 +1039,7 @@
         <p:txBody>
           <a:bodyPr/>
           <a:p>
-            <a:fld id="{737D288B-5947-485A-B04E-DEBBC7B2F41E}" type="slidenum">
+            <a:fld id="{95F4B354-B790-449B-8C46-256E7F5C999E}" type="slidenum">
               <a:t>&lt;#&gt;</a:t>
             </a:fld>
           </a:p>
@@ -1101,7 +1101,7 @@
         <p:spPr>
           <a:xfrm>
             <a:off x="457200" y="274680"/>
-            <a:ext cx="8228520" cy="1141920"/>
+            <a:ext cx="8228160" cy="1141560"/>
           </a:xfrm>
           <a:prstGeom prst="rect">
             <a:avLst/>
@@ -1162,7 +1162,7 @@
         <p:txBody>
           <a:bodyPr/>
           <a:p>
-            <a:fld id="{3E3F15F2-44E5-441E-AB0B-AB4919939BCE}" type="slidenum">
+            <a:fld id="{04966E93-00C0-400F-83C0-CFCE776B16AF}" type="slidenum">
               <a:t>&lt;#&gt;</a:t>
             </a:fld>
           </a:p>
@@ -1245,7 +1245,7 @@
         <p:txBody>
           <a:bodyPr/>
           <a:p>
-            <a:fld id="{DBA8F98F-47AF-4486-82A5-F12AA40C9917}" type="slidenum">
+            <a:fld id="{255BA253-5F5A-41C5-BC48-3177D0097E0F}" type="slidenum">
               <a:t>&lt;#&gt;</a:t>
             </a:fld>
           </a:p>
@@ -1314,7 +1314,7 @@
         <p:spPr>
           <a:xfrm>
             <a:off x="457200" y="274680"/>
-            <a:ext cx="8228520" cy="1141920"/>
+            <a:ext cx="8228160" cy="1141560"/>
           </a:xfrm>
           <a:prstGeom prst="rect">
             <a:avLst/>
@@ -1363,7 +1363,7 @@
         <p:spPr>
           <a:xfrm>
             <a:off x="3124080" y="6356520"/>
-            <a:ext cx="2894400" cy="363960"/>
+            <a:ext cx="2894040" cy="363600"/>
           </a:xfrm>
           <a:prstGeom prst="rect">
             <a:avLst/>
@@ -1411,7 +1411,7 @@
                 </a:solidFill>
                 <a:latin typeface="Times New Roman"/>
               </a:rPr>
-              <a:t> </a:t>
+              <a:t>&lt;footer&gt;</a:t>
             </a:r>
             <a:endParaRPr b="0" lang="en-US" sz="1400" spc="-1" strike="noStrike">
               <a:solidFill>
@@ -1435,7 +1435,7 @@
         <p:spPr>
           <a:xfrm>
             <a:off x="6553080" y="6356520"/>
-            <a:ext cx="2132640" cy="363960"/>
+            <a:ext cx="2132280" cy="363600"/>
           </a:xfrm>
           <a:prstGeom prst="rect">
             <a:avLst/>
@@ -1478,7 +1478,7 @@
                 <a:tab algn="l" pos="0"/>
               </a:tabLst>
             </a:pPr>
-            <a:fld id="{BE886B0A-0E68-448B-B70B-C664032BC713}" type="slidenum">
+            <a:fld id="{007DEFA6-D4FE-45B7-9D14-AEC15A1C1554}" type="slidenum">
               <a:rPr b="0" lang="en-US" sz="1200" spc="-1" strike="noStrike">
                 <a:solidFill>
                   <a:schemeClr val="dk1">
@@ -1487,7 +1487,7 @@
                 </a:solidFill>
                 <a:latin typeface="Calibri"/>
               </a:rPr>
-              <a:t>4</a:t>
+              <a:t>&lt;number&gt;</a:t>
             </a:fld>
             <a:endParaRPr b="0" lang="en-US" sz="1200" spc="-1" strike="noStrike">
               <a:solidFill>
@@ -1511,7 +1511,7 @@
         <p:spPr>
           <a:xfrm>
             <a:off x="457200" y="6356520"/>
-            <a:ext cx="2132640" cy="363960"/>
+            <a:ext cx="2132280" cy="363600"/>
           </a:xfrm>
           <a:prstGeom prst="rect">
             <a:avLst/>
@@ -1547,7 +1547,7 @@
                 </a:solidFill>
                 <a:latin typeface="Times New Roman"/>
               </a:rPr>
-              <a:t> </a:t>
+              <a:t>&lt;date/time&gt;</a:t>
             </a:r>
             <a:endParaRPr b="0" lang="en-US" sz="1400" spc="-1" strike="noStrike">
               <a:solidFill>
@@ -1829,7 +1829,7 @@
         <p:spPr>
           <a:xfrm>
             <a:off x="3124080" y="6356520"/>
-            <a:ext cx="2894400" cy="363960"/>
+            <a:ext cx="2894040" cy="363600"/>
           </a:xfrm>
           <a:prstGeom prst="rect">
             <a:avLst/>
@@ -1901,7 +1901,7 @@
         <p:spPr>
           <a:xfrm>
             <a:off x="6553080" y="6356520"/>
-            <a:ext cx="2132640" cy="363960"/>
+            <a:ext cx="2132280" cy="363600"/>
           </a:xfrm>
           <a:prstGeom prst="rect">
             <a:avLst/>
@@ -1944,7 +1944,7 @@
                 <a:tab algn="l" pos="0"/>
               </a:tabLst>
             </a:pPr>
-            <a:fld id="{5C64FBDD-B349-44B5-AC2A-B1C26A1C2C83}" type="slidenum">
+            <a:fld id="{99404F6E-60C2-408A-9EDC-49A504CF05EE}" type="slidenum">
               <a:rPr b="0" lang="en-US" sz="1200" spc="-1" strike="noStrike">
                 <a:solidFill>
                   <a:schemeClr val="dk1">
@@ -1977,7 +1977,7 @@
         <p:spPr>
           <a:xfrm>
             <a:off x="457200" y="6356520"/>
-            <a:ext cx="2132640" cy="363960"/>
+            <a:ext cx="2132280" cy="363600"/>
           </a:xfrm>
           <a:prstGeom prst="rect">
             <a:avLst/>
@@ -2070,7 +2070,7 @@
         <p:spPr>
           <a:xfrm>
             <a:off x="3124080" y="6356520"/>
-            <a:ext cx="2894400" cy="363960"/>
+            <a:ext cx="2894040" cy="363600"/>
           </a:xfrm>
           <a:prstGeom prst="rect">
             <a:avLst/>
@@ -2142,7 +2142,7 @@
         <p:spPr>
           <a:xfrm>
             <a:off x="6553080" y="6356520"/>
-            <a:ext cx="2132640" cy="363960"/>
+            <a:ext cx="2132280" cy="363600"/>
           </a:xfrm>
           <a:prstGeom prst="rect">
             <a:avLst/>
@@ -2185,7 +2185,7 @@
                 <a:tab algn="l" pos="0"/>
               </a:tabLst>
             </a:pPr>
-            <a:fld id="{3D512C6E-31EC-4708-975C-D9395EE90C45}" type="slidenum">
+            <a:fld id="{E810FEE9-74FB-4B0F-BD9E-0F4A9B50DCBE}" type="slidenum">
               <a:rPr b="0" lang="en-US" sz="1200" spc="-1" strike="noStrike">
                 <a:solidFill>
                   <a:schemeClr val="dk1">
@@ -2218,7 +2218,7 @@
         <p:spPr>
           <a:xfrm>
             <a:off x="457200" y="6356520"/>
-            <a:ext cx="2132640" cy="363960"/>
+            <a:ext cx="2132280" cy="363600"/>
           </a:xfrm>
           <a:prstGeom prst="rect">
             <a:avLst/>
@@ -2311,7 +2311,7 @@
         <p:spPr>
           <a:xfrm>
             <a:off x="3124080" y="6356520"/>
-            <a:ext cx="2894400" cy="363960"/>
+            <a:ext cx="2894040" cy="363600"/>
           </a:xfrm>
           <a:prstGeom prst="rect">
             <a:avLst/>
@@ -2383,7 +2383,7 @@
         <p:spPr>
           <a:xfrm>
             <a:off x="6553080" y="6356520"/>
-            <a:ext cx="2132640" cy="363960"/>
+            <a:ext cx="2132280" cy="363600"/>
           </a:xfrm>
           <a:prstGeom prst="rect">
             <a:avLst/>
@@ -2426,7 +2426,7 @@
                 <a:tab algn="l" pos="0"/>
               </a:tabLst>
             </a:pPr>
-            <a:fld id="{E99CCD12-C164-4117-994B-3B844E9C4AD4}" type="slidenum">
+            <a:fld id="{CBBF1E0A-F582-4A78-A7D8-B6D4E9E2D394}" type="slidenum">
               <a:rPr b="0" lang="en-US" sz="1200" spc="-1" strike="noStrike">
                 <a:solidFill>
                   <a:schemeClr val="dk1">
@@ -2459,7 +2459,7 @@
         <p:spPr>
           <a:xfrm>
             <a:off x="457200" y="6356520"/>
-            <a:ext cx="2132640" cy="363960"/>
+            <a:ext cx="2132280" cy="363600"/>
           </a:xfrm>
           <a:prstGeom prst="rect">
             <a:avLst/>
@@ -2552,7 +2552,7 @@
         <p:spPr>
           <a:xfrm>
             <a:off x="3124080" y="6356520"/>
-            <a:ext cx="2894400" cy="363960"/>
+            <a:ext cx="2894040" cy="363600"/>
           </a:xfrm>
           <a:prstGeom prst="rect">
             <a:avLst/>
@@ -2624,7 +2624,7 @@
         <p:spPr>
           <a:xfrm>
             <a:off x="6553080" y="6356520"/>
-            <a:ext cx="2132640" cy="363960"/>
+            <a:ext cx="2132280" cy="363600"/>
           </a:xfrm>
           <a:prstGeom prst="rect">
             <a:avLst/>
@@ -2667,7 +2667,7 @@
                 <a:tab algn="l" pos="0"/>
               </a:tabLst>
             </a:pPr>
-            <a:fld id="{D550801A-5E93-45C0-B07E-B70E1B5FDB63}" type="slidenum">
+            <a:fld id="{A386FF2C-D999-4D56-803D-6BE46C831EA4}" type="slidenum">
               <a:rPr b="0" lang="en-US" sz="1200" spc="-1" strike="noStrike">
                 <a:solidFill>
                   <a:schemeClr val="dk1">
@@ -2700,7 +2700,7 @@
         <p:spPr>
           <a:xfrm>
             <a:off x="457200" y="6356520"/>
-            <a:ext cx="2132640" cy="363960"/>
+            <a:ext cx="2132280" cy="363600"/>
           </a:xfrm>
           <a:prstGeom prst="rect">
             <a:avLst/>
@@ -2793,7 +2793,7 @@
         <p:spPr>
           <a:xfrm>
             <a:off x="457200" y="274680"/>
-            <a:ext cx="8228520" cy="1141920"/>
+            <a:ext cx="8228160" cy="1141560"/>
           </a:xfrm>
           <a:prstGeom prst="rect">
             <a:avLst/>
@@ -2842,7 +2842,7 @@
         <p:spPr>
           <a:xfrm>
             <a:off x="457200" y="1600200"/>
-            <a:ext cx="8228520" cy="4524840"/>
+            <a:ext cx="8228160" cy="4524480"/>
           </a:xfrm>
           <a:prstGeom prst="rect">
             <a:avLst/>
@@ -3067,7 +3067,7 @@
         <p:spPr>
           <a:xfrm>
             <a:off x="3124080" y="6356520"/>
-            <a:ext cx="2894400" cy="363960"/>
+            <a:ext cx="2894040" cy="363600"/>
           </a:xfrm>
           <a:prstGeom prst="rect">
             <a:avLst/>
@@ -3139,7 +3139,7 @@
         <p:spPr>
           <a:xfrm>
             <a:off x="6553080" y="6356520"/>
-            <a:ext cx="2132640" cy="363960"/>
+            <a:ext cx="2132280" cy="363600"/>
           </a:xfrm>
           <a:prstGeom prst="rect">
             <a:avLst/>
@@ -3182,7 +3182,7 @@
                 <a:tab algn="l" pos="0"/>
               </a:tabLst>
             </a:pPr>
-            <a:fld id="{38B7CEC5-7325-4D7B-8C20-8327DA677ED0}" type="slidenum">
+            <a:fld id="{306396A7-234E-475F-828F-03F195EFF360}" type="slidenum">
               <a:rPr b="0" lang="en-US" sz="1200" spc="-1" strike="noStrike">
                 <a:solidFill>
                   <a:schemeClr val="dk1">
@@ -3215,7 +3215,7 @@
         <p:spPr>
           <a:xfrm>
             <a:off x="457200" y="6356520"/>
-            <a:ext cx="2132640" cy="363960"/>
+            <a:ext cx="2132280" cy="363600"/>
           </a:xfrm>
           <a:prstGeom prst="rect">
             <a:avLst/>
@@ -3308,7 +3308,7 @@
         <p:spPr>
           <a:xfrm>
             <a:off x="3124080" y="6356520"/>
-            <a:ext cx="2894400" cy="363960"/>
+            <a:ext cx="2894040" cy="363600"/>
           </a:xfrm>
           <a:prstGeom prst="rect">
             <a:avLst/>
@@ -3380,7 +3380,7 @@
         <p:spPr>
           <a:xfrm>
             <a:off x="6553080" y="6356520"/>
-            <a:ext cx="2132640" cy="363960"/>
+            <a:ext cx="2132280" cy="363600"/>
           </a:xfrm>
           <a:prstGeom prst="rect">
             <a:avLst/>
@@ -3423,7 +3423,7 @@
                 <a:tab algn="l" pos="0"/>
               </a:tabLst>
             </a:pPr>
-            <a:fld id="{3134C8C4-922A-4862-96E8-B9F23193A124}" type="slidenum">
+            <a:fld id="{BE8B246C-C27C-409B-933C-9D68790E327D}" type="slidenum">
               <a:rPr b="0" lang="en-US" sz="1200" spc="-1" strike="noStrike">
                 <a:solidFill>
                   <a:schemeClr val="dk1">
@@ -3456,7 +3456,7 @@
         <p:spPr>
           <a:xfrm>
             <a:off x="457200" y="6356520"/>
-            <a:ext cx="2132640" cy="363960"/>
+            <a:ext cx="2132280" cy="363600"/>
           </a:xfrm>
           <a:prstGeom prst="rect">
             <a:avLst/>
@@ -3549,7 +3549,7 @@
         <p:spPr>
           <a:xfrm>
             <a:off x="457200" y="274680"/>
-            <a:ext cx="8228520" cy="1141920"/>
+            <a:ext cx="8228160" cy="1141560"/>
           </a:xfrm>
           <a:prstGeom prst="rect">
             <a:avLst/>
@@ -3598,7 +3598,7 @@
         <p:spPr>
           <a:xfrm>
             <a:off x="457200" y="1600200"/>
-            <a:ext cx="4015080" cy="4524840"/>
+            <a:ext cx="4015080" cy="4524480"/>
           </a:xfrm>
           <a:prstGeom prst="rect">
             <a:avLst/>
@@ -3823,7 +3823,7 @@
         <p:spPr>
           <a:xfrm>
             <a:off x="4673880" y="1600200"/>
-            <a:ext cx="4015080" cy="4524840"/>
+            <a:ext cx="4015080" cy="4524480"/>
           </a:xfrm>
           <a:prstGeom prst="rect">
             <a:avLst/>
@@ -4048,7 +4048,7 @@
         <p:spPr>
           <a:xfrm>
             <a:off x="3124080" y="6356520"/>
-            <a:ext cx="2894400" cy="363960"/>
+            <a:ext cx="2894040" cy="363600"/>
           </a:xfrm>
           <a:prstGeom prst="rect">
             <a:avLst/>
@@ -4120,7 +4120,7 @@
         <p:spPr>
           <a:xfrm>
             <a:off x="6553080" y="6356520"/>
-            <a:ext cx="2132640" cy="363960"/>
+            <a:ext cx="2132280" cy="363600"/>
           </a:xfrm>
           <a:prstGeom prst="rect">
             <a:avLst/>
@@ -4163,7 +4163,7 @@
                 <a:tab algn="l" pos="0"/>
               </a:tabLst>
             </a:pPr>
-            <a:fld id="{E20B339E-544C-40D8-8332-E9C08A712BD5}" type="slidenum">
+            <a:fld id="{1C45DD64-5E1D-4EA8-856D-3D819460982C}" type="slidenum">
               <a:rPr b="0" lang="en-US" sz="1200" spc="-1" strike="noStrike">
                 <a:solidFill>
                   <a:schemeClr val="dk1">
@@ -4196,7 +4196,7 @@
         <p:spPr>
           <a:xfrm>
             <a:off x="457200" y="6356520"/>
-            <a:ext cx="2132640" cy="363960"/>
+            <a:ext cx="2132280" cy="363600"/>
           </a:xfrm>
           <a:prstGeom prst="rect">
             <a:avLst/>
@@ -4289,7 +4289,7 @@
         <p:spPr>
           <a:xfrm>
             <a:off x="3124080" y="6356520"/>
-            <a:ext cx="2894400" cy="363960"/>
+            <a:ext cx="2894040" cy="363600"/>
           </a:xfrm>
           <a:prstGeom prst="rect">
             <a:avLst/>
@@ -4361,7 +4361,7 @@
         <p:spPr>
           <a:xfrm>
             <a:off x="6553080" y="6356520"/>
-            <a:ext cx="2132640" cy="363960"/>
+            <a:ext cx="2132280" cy="363600"/>
           </a:xfrm>
           <a:prstGeom prst="rect">
             <a:avLst/>
@@ -4404,7 +4404,7 @@
                 <a:tab algn="l" pos="0"/>
               </a:tabLst>
             </a:pPr>
-            <a:fld id="{0EB7B6A2-D2FD-4D0E-A6CA-C1A7553B0139}" type="slidenum">
+            <a:fld id="{10C3D6F4-B29F-47BC-BB02-068EE1B1C649}" type="slidenum">
               <a:rPr b="0" lang="en-US" sz="1200" spc="-1" strike="noStrike">
                 <a:solidFill>
                   <a:schemeClr val="dk1">
@@ -4437,7 +4437,7 @@
         <p:spPr>
           <a:xfrm>
             <a:off x="457200" y="6356520"/>
-            <a:ext cx="2132640" cy="363960"/>
+            <a:ext cx="2132280" cy="363600"/>
           </a:xfrm>
           <a:prstGeom prst="rect">
             <a:avLst/>
@@ -4530,7 +4530,7 @@
         <p:spPr>
           <a:xfrm>
             <a:off x="457200" y="274680"/>
-            <a:ext cx="8228520" cy="1141920"/>
+            <a:ext cx="8228160" cy="1141560"/>
           </a:xfrm>
           <a:prstGeom prst="rect">
             <a:avLst/>
@@ -4579,7 +4579,7 @@
         <p:spPr>
           <a:xfrm>
             <a:off x="3124080" y="6356520"/>
-            <a:ext cx="2894400" cy="363960"/>
+            <a:ext cx="2894040" cy="363600"/>
           </a:xfrm>
           <a:prstGeom prst="rect">
             <a:avLst/>
@@ -4651,7 +4651,7 @@
         <p:spPr>
           <a:xfrm>
             <a:off x="6553080" y="6356520"/>
-            <a:ext cx="2132640" cy="363960"/>
+            <a:ext cx="2132280" cy="363600"/>
           </a:xfrm>
           <a:prstGeom prst="rect">
             <a:avLst/>
@@ -4694,7 +4694,7 @@
                 <a:tab algn="l" pos="0"/>
               </a:tabLst>
             </a:pPr>
-            <a:fld id="{A0E836DA-8905-4038-9C9D-C699A0CB6A85}" type="slidenum">
+            <a:fld id="{F4AE61C4-C8F8-4455-822D-081E48328C9F}" type="slidenum">
               <a:rPr b="0" lang="en-US" sz="1200" spc="-1" strike="noStrike">
                 <a:solidFill>
                   <a:schemeClr val="dk1">
@@ -4727,7 +4727,7 @@
         <p:spPr>
           <a:xfrm>
             <a:off x="457200" y="6356520"/>
-            <a:ext cx="2132640" cy="363960"/>
+            <a:ext cx="2132280" cy="363600"/>
           </a:xfrm>
           <a:prstGeom prst="rect">
             <a:avLst/>
@@ -4820,7 +4820,7 @@
         <p:spPr>
           <a:xfrm>
             <a:off x="3124080" y="6356520"/>
-            <a:ext cx="2894400" cy="363960"/>
+            <a:ext cx="2894040" cy="363600"/>
           </a:xfrm>
           <a:prstGeom prst="rect">
             <a:avLst/>
@@ -4892,7 +4892,7 @@
         <p:spPr>
           <a:xfrm>
             <a:off x="6553080" y="6356520"/>
-            <a:ext cx="2132640" cy="363960"/>
+            <a:ext cx="2132280" cy="363600"/>
           </a:xfrm>
           <a:prstGeom prst="rect">
             <a:avLst/>
@@ -4935,7 +4935,7 @@
                 <a:tab algn="l" pos="0"/>
               </a:tabLst>
             </a:pPr>
-            <a:fld id="{6DD0EA90-D776-4C81-8EEC-A33420A56959}" type="slidenum">
+            <a:fld id="{342F3888-BE1D-49B4-8EE5-9B5B1065A4A4}" type="slidenum">
               <a:rPr b="0" lang="en-US" sz="1200" spc="-1" strike="noStrike">
                 <a:solidFill>
                   <a:schemeClr val="dk1">
@@ -4968,7 +4968,7 @@
         <p:spPr>
           <a:xfrm>
             <a:off x="457200" y="6356520"/>
-            <a:ext cx="2132640" cy="363960"/>
+            <a:ext cx="2132280" cy="363600"/>
           </a:xfrm>
           <a:prstGeom prst="rect">
             <a:avLst/>
@@ -5054,7 +5054,7 @@
         <p:spPr>
           <a:xfrm>
             <a:off x="685800" y="2130480"/>
-            <a:ext cx="7771320" cy="1468800"/>
+            <a:ext cx="7770960" cy="1468440"/>
           </a:xfrm>
           <a:prstGeom prst="rect">
             <a:avLst/>
@@ -5109,7 +5109,7 @@
         <p:spPr>
           <a:xfrm>
             <a:off x="1371600" y="3886200"/>
-            <a:ext cx="6399720" cy="1751400"/>
+            <a:ext cx="6399360" cy="1751040"/>
           </a:xfrm>
           <a:prstGeom prst="rect">
             <a:avLst/>
@@ -5194,7 +5194,7 @@
         <p:spPr>
           <a:xfrm>
             <a:off x="457200" y="274680"/>
-            <a:ext cx="8228520" cy="1141920"/>
+            <a:ext cx="8228160" cy="1141560"/>
           </a:xfrm>
           <a:prstGeom prst="rect">
             <a:avLst/>
@@ -5249,7 +5249,7 @@
         <p:spPr>
           <a:xfrm>
             <a:off x="457200" y="1600200"/>
-            <a:ext cx="8228520" cy="4524840"/>
+            <a:ext cx="8228160" cy="4524480"/>
           </a:xfrm>
           <a:prstGeom prst="rect">
             <a:avLst/>
@@ -5460,7 +5460,7 @@
         <p:spPr>
           <a:xfrm>
             <a:off x="457200" y="274680"/>
-            <a:ext cx="8228520" cy="1141920"/>
+            <a:ext cx="8228160" cy="1141560"/>
           </a:xfrm>
           <a:prstGeom prst="rect">
             <a:avLst/>
@@ -5515,7 +5515,7 @@
         <p:spPr>
           <a:xfrm>
             <a:off x="457200" y="1600200"/>
-            <a:ext cx="8228520" cy="4524840"/>
+            <a:ext cx="8228160" cy="4524480"/>
           </a:xfrm>
           <a:prstGeom prst="rect">
             <a:avLst/>
@@ -5726,7 +5726,7 @@
         <p:spPr>
           <a:xfrm>
             <a:off x="457200" y="274680"/>
-            <a:ext cx="8228520" cy="1141920"/>
+            <a:ext cx="8228160" cy="1141560"/>
           </a:xfrm>
           <a:prstGeom prst="rect">
             <a:avLst/>
@@ -5781,7 +5781,7 @@
         <p:spPr>
           <a:xfrm>
             <a:off x="457200" y="1600200"/>
-            <a:ext cx="8228520" cy="4524840"/>
+            <a:ext cx="8228160" cy="4524480"/>
           </a:xfrm>
           <a:prstGeom prst="rect">
             <a:avLst/>
@@ -5959,7 +5959,7 @@
         <p:spPr>
           <a:xfrm>
             <a:off x="457200" y="274680"/>
-            <a:ext cx="8228520" cy="1141920"/>
+            <a:ext cx="8228160" cy="1141560"/>
           </a:xfrm>
           <a:prstGeom prst="rect">
             <a:avLst/>
@@ -6014,7 +6014,7 @@
         <p:spPr>
           <a:xfrm>
             <a:off x="457200" y="1600200"/>
-            <a:ext cx="8228520" cy="4524840"/>
+            <a:ext cx="8228160" cy="4524480"/>
           </a:xfrm>
           <a:prstGeom prst="rect">
             <a:avLst/>
@@ -6192,7 +6192,7 @@
         <p:spPr>
           <a:xfrm>
             <a:off x="457200" y="274680"/>
-            <a:ext cx="8228520" cy="1141920"/>
+            <a:ext cx="8228160" cy="1141560"/>
           </a:xfrm>
           <a:prstGeom prst="rect">
             <a:avLst/>
@@ -6247,7 +6247,7 @@
         <p:spPr>
           <a:xfrm>
             <a:off x="457200" y="1600200"/>
-            <a:ext cx="8228520" cy="4524840"/>
+            <a:ext cx="8228160" cy="4524480"/>
           </a:xfrm>
           <a:prstGeom prst="rect">
             <a:avLst/>
@@ -6425,7 +6425,7 @@
         <p:spPr>
           <a:xfrm>
             <a:off x="457200" y="274680"/>
-            <a:ext cx="8228520" cy="1141920"/>
+            <a:ext cx="8228160" cy="1141560"/>
           </a:xfrm>
           <a:prstGeom prst="rect">
             <a:avLst/>
@@ -6480,7 +6480,7 @@
         <p:spPr>
           <a:xfrm>
             <a:off x="457200" y="1600200"/>
-            <a:ext cx="8228520" cy="4524840"/>
+            <a:ext cx="8228160" cy="4524480"/>
           </a:xfrm>
           <a:prstGeom prst="rect">
             <a:avLst/>
@@ -6644,6 +6644,9 @@
                 <a:solidFill>
                   <a:schemeClr val="dk1"/>
                 </a:solidFill>
+                <a:highlight>
+                  <a:srgbClr val="81d41a"/>
+                </a:highlight>
                 <a:latin typeface="Calibri"/>
               </a:rPr>
               <a:t>Operators</a:t>
@@ -6772,7 +6775,7 @@
         <p:spPr>
           <a:xfrm>
             <a:off x="457200" y="274680"/>
-            <a:ext cx="8228520" cy="1141920"/>
+            <a:ext cx="8228160" cy="1141560"/>
           </a:xfrm>
           <a:prstGeom prst="rect">
             <a:avLst/>
@@ -6827,7 +6830,7 @@
         <p:spPr>
           <a:xfrm>
             <a:off x="457200" y="1600200"/>
-            <a:ext cx="8228520" cy="4524840"/>
+            <a:ext cx="8228160" cy="4524480"/>
           </a:xfrm>
           <a:prstGeom prst="rect">
             <a:avLst/>
@@ -7005,7 +7008,7 @@
         <p:spPr>
           <a:xfrm>
             <a:off x="457200" y="274680"/>
-            <a:ext cx="8228520" cy="1141920"/>
+            <a:ext cx="8228160" cy="1141560"/>
           </a:xfrm>
           <a:prstGeom prst="rect">
             <a:avLst/>
@@ -7060,7 +7063,7 @@
         <p:spPr>
           <a:xfrm>
             <a:off x="457200" y="1600200"/>
-            <a:ext cx="8228520" cy="4524840"/>
+            <a:ext cx="8228160" cy="4524480"/>
           </a:xfrm>
           <a:prstGeom prst="rect">
             <a:avLst/>
@@ -7271,7 +7274,7 @@
         <p:spPr>
           <a:xfrm>
             <a:off x="457200" y="274680"/>
-            <a:ext cx="8228520" cy="1141920"/>
+            <a:ext cx="8228160" cy="1141560"/>
           </a:xfrm>
           <a:prstGeom prst="rect">
             <a:avLst/>
@@ -7326,7 +7329,7 @@
         <p:spPr>
           <a:xfrm>
             <a:off x="457200" y="1600200"/>
-            <a:ext cx="8228520" cy="4524840"/>
+            <a:ext cx="8228160" cy="4524480"/>
           </a:xfrm>
           <a:prstGeom prst="rect">
             <a:avLst/>
@@ -7537,7 +7540,7 @@
         <p:spPr>
           <a:xfrm>
             <a:off x="457200" y="274680"/>
-            <a:ext cx="8228520" cy="1141920"/>
+            <a:ext cx="8228160" cy="1141560"/>
           </a:xfrm>
           <a:prstGeom prst="rect">
             <a:avLst/>
@@ -7592,7 +7595,7 @@
         <p:spPr>
           <a:xfrm>
             <a:off x="457200" y="1600200"/>
-            <a:ext cx="8228520" cy="4524840"/>
+            <a:ext cx="8228160" cy="4524480"/>
           </a:xfrm>
           <a:prstGeom prst="rect">
             <a:avLst/>
@@ -7737,7 +7740,7 @@
         <p:spPr>
           <a:xfrm>
             <a:off x="457200" y="274680"/>
-            <a:ext cx="8228520" cy="1141920"/>
+            <a:ext cx="8228160" cy="1141560"/>
           </a:xfrm>
           <a:prstGeom prst="rect">
             <a:avLst/>
@@ -7792,7 +7795,7 @@
         <p:spPr>
           <a:xfrm>
             <a:off x="457200" y="1600200"/>
-            <a:ext cx="8228520" cy="4524840"/>
+            <a:ext cx="8228160" cy="4524480"/>
           </a:xfrm>
           <a:prstGeom prst="rect">
             <a:avLst/>
@@ -7970,7 +7973,7 @@
         <p:spPr>
           <a:xfrm>
             <a:off x="457200" y="274680"/>
-            <a:ext cx="8228520" cy="1141920"/>
+            <a:ext cx="8228160" cy="1141560"/>
           </a:xfrm>
           <a:prstGeom prst="rect">
             <a:avLst/>
@@ -8025,7 +8028,7 @@
         <p:spPr>
           <a:xfrm>
             <a:off x="457200" y="1600200"/>
-            <a:ext cx="8228520" cy="4524840"/>
+            <a:ext cx="8228160" cy="4524480"/>
           </a:xfrm>
           <a:prstGeom prst="rect">
             <a:avLst/>
@@ -8236,7 +8239,7 @@
         <p:spPr>
           <a:xfrm>
             <a:off x="457200" y="274680"/>
-            <a:ext cx="8228520" cy="1141920"/>
+            <a:ext cx="8228160" cy="1141560"/>
           </a:xfrm>
           <a:prstGeom prst="rect">
             <a:avLst/>
@@ -8291,7 +8294,7 @@
         <p:spPr>
           <a:xfrm>
             <a:off x="457200" y="1600200"/>
-            <a:ext cx="8228520" cy="4524840"/>
+            <a:ext cx="8228160" cy="4524480"/>
           </a:xfrm>
           <a:prstGeom prst="rect">
             <a:avLst/>

</xml_diff>